<commit_message>
Add PLS results with symptoms, run separate PLS for SSD-only, plot subcortex results
</commit_message>
<xml_diff>
--- a/code/One-min slide.pptx
+++ b/code/One-min slide.pptx
@@ -107,6 +107,11 @@
       </a:defRPr>
     </a:lvl9pPr>
   </p:defaultTextStyle>
+  <p:extLst>
+    <p:ext uri="{EFAFB233-063F-42B5-8137-9DF3F51BA10A}">
+      <p15:sldGuideLst xmlns:p15="http://schemas.microsoft.com/office/powerpoint/2012/main"/>
+    </p:ext>
+  </p:extLst>
 </p:presentation>
 </file>
 
@@ -192,7 +197,7 @@
           <a:p>
             <a:fld id="{279CDB57-6662-42E0-9C93-1F5B5885E3AB}" type="datetimeFigureOut">
               <a:rPr lang="en-US" smtClean="0"/>
-              <a:t>5/30/2022</a:t>
+              <a:t>5/31/2022</a:t>
             </a:fld>
             <a:endParaRPr lang="en-US"/>
           </a:p>
@@ -723,7 +728,7 @@
           <a:p>
             <a:fld id="{B903F45E-69CC-41CE-A997-080048F4A6EC}" type="datetimeFigureOut">
               <a:rPr lang="en-US" smtClean="0"/>
-              <a:t>5/30/2022</a:t>
+              <a:t>5/31/2022</a:t>
             </a:fld>
             <a:endParaRPr lang="en-US"/>
           </a:p>
@@ -921,7 +926,7 @@
           <a:p>
             <a:fld id="{B903F45E-69CC-41CE-A997-080048F4A6EC}" type="datetimeFigureOut">
               <a:rPr lang="en-US" smtClean="0"/>
-              <a:t>5/30/2022</a:t>
+              <a:t>5/31/2022</a:t>
             </a:fld>
             <a:endParaRPr lang="en-US"/>
           </a:p>
@@ -1129,7 +1134,7 @@
           <a:p>
             <a:fld id="{B903F45E-69CC-41CE-A997-080048F4A6EC}" type="datetimeFigureOut">
               <a:rPr lang="en-US" smtClean="0"/>
-              <a:t>5/30/2022</a:t>
+              <a:t>5/31/2022</a:t>
             </a:fld>
             <a:endParaRPr lang="en-US"/>
           </a:p>
@@ -1327,7 +1332,7 @@
           <a:p>
             <a:fld id="{B903F45E-69CC-41CE-A997-080048F4A6EC}" type="datetimeFigureOut">
               <a:rPr lang="en-US" smtClean="0"/>
-              <a:t>5/30/2022</a:t>
+              <a:t>5/31/2022</a:t>
             </a:fld>
             <a:endParaRPr lang="en-US"/>
           </a:p>
@@ -1602,7 +1607,7 @@
           <a:p>
             <a:fld id="{B903F45E-69CC-41CE-A997-080048F4A6EC}" type="datetimeFigureOut">
               <a:rPr lang="en-US" smtClean="0"/>
-              <a:t>5/30/2022</a:t>
+              <a:t>5/31/2022</a:t>
             </a:fld>
             <a:endParaRPr lang="en-US"/>
           </a:p>
@@ -1867,7 +1872,7 @@
           <a:p>
             <a:fld id="{B903F45E-69CC-41CE-A997-080048F4A6EC}" type="datetimeFigureOut">
               <a:rPr lang="en-US" smtClean="0"/>
-              <a:t>5/30/2022</a:t>
+              <a:t>5/31/2022</a:t>
             </a:fld>
             <a:endParaRPr lang="en-US"/>
           </a:p>
@@ -2279,7 +2284,7 @@
           <a:p>
             <a:fld id="{B903F45E-69CC-41CE-A997-080048F4A6EC}" type="datetimeFigureOut">
               <a:rPr lang="en-US" smtClean="0"/>
-              <a:t>5/30/2022</a:t>
+              <a:t>5/31/2022</a:t>
             </a:fld>
             <a:endParaRPr lang="en-US"/>
           </a:p>
@@ -2420,7 +2425,7 @@
           <a:p>
             <a:fld id="{B903F45E-69CC-41CE-A997-080048F4A6EC}" type="datetimeFigureOut">
               <a:rPr lang="en-US" smtClean="0"/>
-              <a:t>5/30/2022</a:t>
+              <a:t>5/31/2022</a:t>
             </a:fld>
             <a:endParaRPr lang="en-US"/>
           </a:p>
@@ -2533,7 +2538,7 @@
           <a:p>
             <a:fld id="{B903F45E-69CC-41CE-A997-080048F4A6EC}" type="datetimeFigureOut">
               <a:rPr lang="en-US" smtClean="0"/>
-              <a:t>5/30/2022</a:t>
+              <a:t>5/31/2022</a:t>
             </a:fld>
             <a:endParaRPr lang="en-US"/>
           </a:p>
@@ -2844,7 +2849,7 @@
           <a:p>
             <a:fld id="{B903F45E-69CC-41CE-A997-080048F4A6EC}" type="datetimeFigureOut">
               <a:rPr lang="en-US" smtClean="0"/>
-              <a:t>5/30/2022</a:t>
+              <a:t>5/31/2022</a:t>
             </a:fld>
             <a:endParaRPr lang="en-US"/>
           </a:p>
@@ -3132,7 +3137,7 @@
           <a:p>
             <a:fld id="{B903F45E-69CC-41CE-A997-080048F4A6EC}" type="datetimeFigureOut">
               <a:rPr lang="en-US" smtClean="0"/>
-              <a:t>5/30/2022</a:t>
+              <a:t>5/31/2022</a:t>
             </a:fld>
             <a:endParaRPr lang="en-US"/>
           </a:p>
@@ -3373,7 +3378,7 @@
           <a:p>
             <a:fld id="{B903F45E-69CC-41CE-A997-080048F4A6EC}" type="datetimeFigureOut">
               <a:rPr lang="en-US" smtClean="0"/>
-              <a:t>5/30/2022</a:t>
+              <a:t>5/31/2022</a:t>
             </a:fld>
             <a:endParaRPr lang="en-US"/>
           </a:p>
@@ -3876,8 +3881,8 @@
         </p:nvSpPr>
         <p:spPr>
           <a:xfrm>
-            <a:off x="405048" y="26816"/>
-            <a:ext cx="11381904" cy="707886"/>
+            <a:off x="126187" y="18154"/>
+            <a:ext cx="11236982" cy="707886"/>
           </a:xfrm>
           <a:prstGeom prst="rect">
             <a:avLst/>
@@ -3890,7 +3895,7 @@
           </a:bodyPr>
           <a:lstStyle/>
           <a:p>
-            <a:pPr algn="ctr" defTabSz="457200"/>
+            <a:pPr defTabSz="457200"/>
             <a:r>
               <a:rPr lang="en-US" sz="2000" dirty="0">
                 <a:solidFill>
@@ -3921,7 +3926,7 @@
         </p:nvSpPr>
         <p:spPr>
           <a:xfrm>
-            <a:off x="126188" y="802542"/>
+            <a:off x="126188" y="793017"/>
             <a:ext cx="4974698" cy="1477328"/>
           </a:xfrm>
           <a:prstGeom prst="rect">
@@ -3982,7 +3987,7 @@
         </p:nvSpPr>
         <p:spPr>
           <a:xfrm>
-            <a:off x="126187" y="4323946"/>
+            <a:off x="126187" y="4314421"/>
             <a:ext cx="5209587" cy="1477328"/>
           </a:xfrm>
           <a:prstGeom prst="rect">
@@ -4067,13 +4072,13 @@
           <p:nvPr>
             <p:extLst>
               <p:ext uri="{D42A27DB-BD31-4B8C-83A1-F6EECF244321}">
-                <p14:modId xmlns:p14="http://schemas.microsoft.com/office/powerpoint/2010/main" val="2874023862"/>
+                <p14:modId xmlns:p14="http://schemas.microsoft.com/office/powerpoint/2010/main" val="240262494"/>
               </p:ext>
             </p:extLst>
           </p:nvPr>
         </p:nvGraphicFramePr>
         <p:xfrm>
-          <a:off x="478726" y="5779148"/>
+          <a:off x="478726" y="5769623"/>
           <a:ext cx="4186832" cy="1005840"/>
         </p:xfrm>
         <a:graphic>
@@ -4413,7 +4418,7 @@
         </p:nvSpPr>
         <p:spPr>
           <a:xfrm>
-            <a:off x="5382638" y="3215114"/>
+            <a:off x="5382638" y="3205589"/>
             <a:ext cx="6930404" cy="646331"/>
           </a:xfrm>
           <a:prstGeom prst="rect">
@@ -4459,7 +4464,7 @@
         </p:nvSpPr>
         <p:spPr>
           <a:xfrm>
-            <a:off x="7797534" y="5909802"/>
+            <a:off x="7797534" y="5900277"/>
             <a:ext cx="4418568" cy="923330"/>
           </a:xfrm>
           <a:prstGeom prst="rect">
@@ -4510,7 +4515,7 @@
         </p:nvSpPr>
         <p:spPr>
           <a:xfrm>
-            <a:off x="7400874" y="2836241"/>
+            <a:off x="7400874" y="2826716"/>
             <a:ext cx="4807813" cy="369332"/>
           </a:xfrm>
           <a:prstGeom prst="rect">
@@ -4576,7 +4581,7 @@
         </p:blipFill>
         <p:spPr>
           <a:xfrm>
-            <a:off x="452793" y="2268580"/>
+            <a:off x="452793" y="2259055"/>
             <a:ext cx="1961215" cy="1907418"/>
           </a:xfrm>
           <a:prstGeom prst="rect">
@@ -4598,7 +4603,7 @@
         </p:nvSpPr>
         <p:spPr>
           <a:xfrm>
-            <a:off x="877503" y="2205838"/>
+            <a:off x="877503" y="2247417"/>
             <a:ext cx="2574936" cy="276999"/>
           </a:xfrm>
           <a:prstGeom prst="rect">
@@ -4613,7 +4618,7 @@
           <a:lstStyle/>
           <a:p>
             <a:r>
-              <a:rPr lang="en-US" sz="1200" b="1" dirty="0"/>
+              <a:rPr lang="en-US" sz="1200" b="1" u="sng" dirty="0"/>
               <a:t>Cortical Networks in “gradient space”</a:t>
             </a:r>
           </a:p>
@@ -4641,7 +4646,7 @@
         </p:blipFill>
         <p:spPr>
           <a:xfrm>
-            <a:off x="2050795" y="3982185"/>
+            <a:off x="2050795" y="3972660"/>
             <a:ext cx="394205" cy="281365"/>
           </a:xfrm>
           <a:prstGeom prst="rect">
@@ -4671,7 +4676,7 @@
         </p:blipFill>
         <p:spPr>
           <a:xfrm>
-            <a:off x="2290668" y="3730449"/>
+            <a:off x="2290668" y="3720924"/>
             <a:ext cx="389331" cy="260002"/>
           </a:xfrm>
           <a:prstGeom prst="rect">
@@ -4700,7 +4705,7 @@
         </p:blipFill>
         <p:spPr>
           <a:xfrm>
-            <a:off x="461134" y="3753253"/>
+            <a:off x="461134" y="3743728"/>
             <a:ext cx="389331" cy="269297"/>
           </a:xfrm>
           <a:prstGeom prst="rect">
@@ -4729,7 +4734,7 @@
         </p:blipFill>
         <p:spPr>
           <a:xfrm>
-            <a:off x="647585" y="3976956"/>
+            <a:off x="647585" y="3967431"/>
             <a:ext cx="436679" cy="277261"/>
           </a:xfrm>
           <a:prstGeom prst="rect">
@@ -4758,7 +4763,7 @@
         </p:blipFill>
         <p:spPr>
           <a:xfrm>
-            <a:off x="113780" y="3027724"/>
+            <a:off x="113780" y="3018199"/>
             <a:ext cx="369403" cy="275216"/>
           </a:xfrm>
           <a:prstGeom prst="rect">
@@ -4787,7 +4792,7 @@
         </p:blipFill>
         <p:spPr>
           <a:xfrm>
-            <a:off x="197234" y="3302982"/>
+            <a:off x="197234" y="3293457"/>
             <a:ext cx="415628" cy="288550"/>
           </a:xfrm>
           <a:prstGeom prst="rect">
@@ -4816,7 +4821,7 @@
         </p:blipFill>
         <p:spPr>
           <a:xfrm>
-            <a:off x="2513584" y="2885800"/>
+            <a:off x="2513584" y="2876275"/>
             <a:ext cx="364817" cy="626454"/>
           </a:xfrm>
           <a:prstGeom prst="rect">
@@ -4838,7 +4843,7 @@
         </p:nvSpPr>
         <p:spPr>
           <a:xfrm>
-            <a:off x="104553" y="824194"/>
+            <a:off x="104553" y="814669"/>
             <a:ext cx="5177496" cy="276999"/>
           </a:xfrm>
           <a:prstGeom prst="roundRect">
@@ -4847,13 +4852,11 @@
             </a:avLst>
           </a:prstGeom>
           <a:solidFill>
-            <a:schemeClr val="accent3">
-              <a:lumMod val="75000"/>
-            </a:schemeClr>
+            <a:schemeClr val="accent4"/>
           </a:solidFill>
           <a:ln>
             <a:solidFill>
-              <a:schemeClr val="accent3">
+              <a:schemeClr val="accent4">
                 <a:lumMod val="50000"/>
               </a:schemeClr>
             </a:solidFill>
@@ -4883,7 +4886,7 @@
             <a:r>
               <a:rPr lang="en-US" dirty="0">
                 <a:solidFill>
-                  <a:schemeClr val="accent3">
+                  <a:schemeClr val="accent4">
                     <a:lumMod val="20000"/>
                     <a:lumOff val="80000"/>
                   </a:schemeClr>
@@ -4908,7 +4911,7 @@
         </p:nvSpPr>
         <p:spPr>
           <a:xfrm>
-            <a:off x="104553" y="4343447"/>
+            <a:off x="104553" y="4333922"/>
             <a:ext cx="5177496" cy="276999"/>
           </a:xfrm>
           <a:prstGeom prst="roundRect">
@@ -4917,13 +4920,11 @@
             </a:avLst>
           </a:prstGeom>
           <a:solidFill>
-            <a:schemeClr val="accent3">
-              <a:lumMod val="75000"/>
-            </a:schemeClr>
+            <a:schemeClr val="accent4"/>
           </a:solidFill>
           <a:ln>
             <a:solidFill>
-              <a:schemeClr val="accent3">
+              <a:schemeClr val="accent4">
                 <a:lumMod val="50000"/>
               </a:schemeClr>
             </a:solidFill>
@@ -4953,7 +4954,7 @@
             <a:r>
               <a:rPr lang="en-US" dirty="0">
                 <a:solidFill>
-                  <a:schemeClr val="accent3">
+                  <a:schemeClr val="accent4">
                     <a:lumMod val="20000"/>
                     <a:lumOff val="80000"/>
                   </a:schemeClr>
@@ -4978,7 +4979,7 @@
         </p:nvSpPr>
         <p:spPr>
           <a:xfrm>
-            <a:off x="5382638" y="824195"/>
+            <a:off x="5382638" y="814670"/>
             <a:ext cx="6704809" cy="276999"/>
           </a:xfrm>
           <a:prstGeom prst="roundRect">
@@ -4987,13 +4988,11 @@
             </a:avLst>
           </a:prstGeom>
           <a:solidFill>
-            <a:schemeClr val="accent3">
-              <a:lumMod val="75000"/>
-            </a:schemeClr>
+            <a:schemeClr val="accent4"/>
           </a:solidFill>
           <a:ln>
             <a:solidFill>
-              <a:schemeClr val="accent3">
+              <a:schemeClr val="accent4">
                 <a:lumMod val="50000"/>
               </a:schemeClr>
             </a:solidFill>
@@ -5023,7 +5022,7 @@
             <a:r>
               <a:rPr lang="en-US" dirty="0">
                 <a:solidFill>
-                  <a:schemeClr val="accent3">
+                  <a:schemeClr val="accent4">
                     <a:lumMod val="20000"/>
                     <a:lumOff val="80000"/>
                   </a:schemeClr>
@@ -5048,7 +5047,7 @@
         </p:nvSpPr>
         <p:spPr>
           <a:xfrm>
-            <a:off x="5384451" y="3230665"/>
+            <a:off x="5384451" y="3221140"/>
             <a:ext cx="6702996" cy="276999"/>
           </a:xfrm>
           <a:prstGeom prst="roundRect">
@@ -5057,13 +5056,11 @@
             </a:avLst>
           </a:prstGeom>
           <a:solidFill>
-            <a:schemeClr val="accent3">
-              <a:lumMod val="75000"/>
-            </a:schemeClr>
+            <a:schemeClr val="accent4"/>
           </a:solidFill>
           <a:ln>
             <a:solidFill>
-              <a:schemeClr val="accent3">
+              <a:schemeClr val="accent4">
                 <a:lumMod val="50000"/>
               </a:schemeClr>
             </a:solidFill>
@@ -5093,7 +5090,7 @@
             <a:r>
               <a:rPr lang="en-US" dirty="0">
                 <a:solidFill>
-                  <a:schemeClr val="accent3">
+                  <a:schemeClr val="accent4">
                     <a:lumMod val="20000"/>
                     <a:lumOff val="80000"/>
                   </a:schemeClr>
@@ -5137,7 +5134,7 @@
         </p:blipFill>
         <p:spPr>
           <a:xfrm>
-            <a:off x="5470634" y="3833302"/>
+            <a:off x="5470634" y="3823777"/>
             <a:ext cx="2411184" cy="1443057"/>
           </a:xfrm>
           <a:prstGeom prst="rect">
@@ -5177,7 +5174,7 @@
         </p:blipFill>
         <p:spPr>
           <a:xfrm>
-            <a:off x="5424304" y="5285529"/>
+            <a:off x="5424304" y="5276004"/>
             <a:ext cx="2373230" cy="1554317"/>
           </a:xfrm>
           <a:prstGeom prst="rect">
@@ -5217,7 +5214,7 @@
         </p:blipFill>
         <p:spPr>
           <a:xfrm>
-            <a:off x="5503751" y="5251716"/>
+            <a:off x="5503751" y="5242191"/>
             <a:ext cx="694556" cy="115815"/>
           </a:xfrm>
           <a:prstGeom prst="rect">
@@ -5258,7 +5255,7 @@
         </p:blipFill>
         <p:spPr>
           <a:xfrm>
-            <a:off x="5424304" y="1060340"/>
+            <a:off x="5424304" y="1050815"/>
             <a:ext cx="2023178" cy="2160784"/>
           </a:xfrm>
           <a:prstGeom prst="rect">
@@ -5299,7 +5296,7 @@
         </p:blipFill>
         <p:spPr>
           <a:xfrm>
-            <a:off x="7797534" y="1003381"/>
+            <a:off x="7797534" y="993856"/>
             <a:ext cx="3534502" cy="1938275"/>
           </a:xfrm>
           <a:prstGeom prst="rect">
@@ -5340,7 +5337,7 @@
         </p:blipFill>
         <p:spPr>
           <a:xfrm>
-            <a:off x="7876981" y="3795947"/>
+            <a:off x="7876981" y="3786422"/>
             <a:ext cx="2025933" cy="2179353"/>
           </a:xfrm>
           <a:prstGeom prst="rect">
@@ -5381,7 +5378,7 @@
         </p:blipFill>
         <p:spPr>
           <a:xfrm>
-            <a:off x="9810731" y="3891915"/>
+            <a:off x="9810731" y="3882390"/>
             <a:ext cx="2405371" cy="1974258"/>
           </a:xfrm>
           <a:prstGeom prst="rect">
@@ -5421,13 +5418,13 @@
               </a:ext>
             </a:extLst>
           </a:blip>
-          <a:srcRect l="19788"/>
+          <a:srcRect l="19003" t="1631" r="550" b="1312"/>
           <a:stretch/>
         </p:blipFill>
         <p:spPr>
           <a:xfrm>
-            <a:off x="3836417" y="2925913"/>
-            <a:ext cx="1277740" cy="965333"/>
+            <a:off x="3823915" y="2932131"/>
+            <a:ext cx="1281485" cy="936924"/>
           </a:xfrm>
           <a:prstGeom prst="rect">
             <a:avLst/>
@@ -5448,7 +5445,7 @@
         </p:nvSpPr>
         <p:spPr>
           <a:xfrm>
-            <a:off x="3878741" y="3867063"/>
+            <a:off x="3859691" y="3857538"/>
             <a:ext cx="1305165" cy="253916"/>
           </a:xfrm>
           <a:prstGeom prst="rect">
@@ -5501,7 +5498,7 @@
         </p:blipFill>
         <p:spPr>
           <a:xfrm>
-            <a:off x="2976983" y="2716656"/>
+            <a:off x="2976983" y="2707131"/>
             <a:ext cx="846932" cy="1335717"/>
           </a:xfrm>
           <a:prstGeom prst="rect">
@@ -5523,7 +5520,7 @@
         </p:nvSpPr>
         <p:spPr>
           <a:xfrm>
-            <a:off x="8350250" y="4292600"/>
+            <a:off x="8350250" y="4283075"/>
             <a:ext cx="323850" cy="327846"/>
           </a:xfrm>
           <a:prstGeom prst="ellipse">
@@ -5575,7 +5572,7 @@
         </p:nvSpPr>
         <p:spPr>
           <a:xfrm>
-            <a:off x="8394355" y="5280170"/>
+            <a:off x="8394355" y="5270645"/>
             <a:ext cx="323850" cy="327846"/>
           </a:xfrm>
           <a:prstGeom prst="ellipse">
@@ -5627,7 +5624,7 @@
         </p:nvSpPr>
         <p:spPr>
           <a:xfrm>
-            <a:off x="10622203" y="4548223"/>
+            <a:off x="10622203" y="4538698"/>
             <a:ext cx="323850" cy="327846"/>
           </a:xfrm>
           <a:prstGeom prst="ellipse">
@@ -5679,7 +5676,7 @@
         </p:nvSpPr>
         <p:spPr>
           <a:xfrm>
-            <a:off x="10571884" y="4919698"/>
+            <a:off x="10571884" y="4910173"/>
             <a:ext cx="273915" cy="265078"/>
           </a:xfrm>
           <a:prstGeom prst="ellipse">
@@ -5717,6 +5714,52 @@
           </a:p>
         </p:txBody>
       </p:sp>
+      <p:pic>
+        <p:nvPicPr>
+          <p:cNvPr id="37" name="Picture 36" descr="Logo&#10;&#10;Description automatically generated">
+            <a:extLst>
+              <a:ext uri="{FF2B5EF4-FFF2-40B4-BE49-F238E27FC236}">
+                <a16:creationId xmlns:a16="http://schemas.microsoft.com/office/drawing/2014/main" id="{1170415E-7384-6D89-6E10-4CBF3660C586}"/>
+              </a:ext>
+            </a:extLst>
+          </p:cNvPr>
+          <p:cNvPicPr>
+            <a:picLocks noChangeAspect="1"/>
+          </p:cNvPicPr>
+          <p:nvPr/>
+        </p:nvPicPr>
+        <p:blipFill>
+          <a:blip r:embed="rId17">
+            <a:lum bright="70000" contrast="-70000"/>
+            <a:extLst>
+              <a:ext uri="{BEBA8EAE-BF5A-486C-A8C5-ECC9F3942E4B}">
+                <a14:imgProps xmlns:a14="http://schemas.microsoft.com/office/drawing/2010/main">
+                  <a14:imgLayer r:embed="rId18">
+                    <a14:imgEffect>
+                      <a14:saturation sat="66000"/>
+                    </a14:imgEffect>
+                  </a14:imgLayer>
+                </a14:imgProps>
+              </a:ext>
+              <a:ext uri="{28A0092B-C50C-407E-A947-70E740481C1C}">
+                <a14:useLocalDpi xmlns:a14="http://schemas.microsoft.com/office/drawing/2010/main" val="0"/>
+              </a:ext>
+            </a:extLst>
+          </a:blip>
+          <a:stretch>
+            <a:fillRect/>
+          </a:stretch>
+        </p:blipFill>
+        <p:spPr>
+          <a:xfrm>
+            <a:off x="11326722" y="223520"/>
+            <a:ext cx="739091" cy="297153"/>
+          </a:xfrm>
+          <a:prstGeom prst="rect">
+            <a:avLst/>
+          </a:prstGeom>
+        </p:spPr>
+      </p:pic>
     </p:spTree>
     <p:extLst>
       <p:ext uri="{BB962C8B-B14F-4D97-AF65-F5344CB8AC3E}">

</xml_diff>